<commit_message>
updated slide deck with repo info
</commit_message>
<xml_diff>
--- a/UDig_RDNUG Presentation_100517.pptx
+++ b/UDig_RDNUG Presentation_100517.pptx
@@ -5,7 +5,7 @@
     <p:sldMasterId id="2147483648" r:id="rId5"/>
   </p:sldMasterIdLst>
   <p:notesMasterIdLst>
-    <p:notesMasterId r:id="rId13"/>
+    <p:notesMasterId r:id="rId14"/>
   </p:notesMasterIdLst>
   <p:sldIdLst>
     <p:sldId id="256" r:id="rId6"/>
@@ -14,7 +14,8 @@
     <p:sldId id="278" r:id="rId9"/>
     <p:sldId id="268" r:id="rId10"/>
     <p:sldId id="275" r:id="rId11"/>
-    <p:sldId id="267" r:id="rId12"/>
+    <p:sldId id="279" r:id="rId12"/>
+    <p:sldId id="267" r:id="rId13"/>
   </p:sldIdLst>
   <p:sldSz cx="12192000" cy="6858000"/>
   <p:notesSz cx="6858000" cy="9144000"/>
@@ -207,7 +208,7 @@
           <a:p>
             <a:fld id="{F06AB212-13A4-4345-97E2-1708A938C56E}" type="datetimeFigureOut">
               <a:rPr lang="en-US" smtClean="0"/>
-              <a:t>10/4/2017</a:t>
+              <a:t>10/5/2017</a:t>
             </a:fld>
             <a:endParaRPr lang="en-US"/>
           </a:p>
@@ -603,7 +604,7 @@
           <a:p>
             <a:fld id="{CB384556-554C-48AB-B5D9-820D487758A7}" type="datetimeFigureOut">
               <a:rPr lang="en-US" smtClean="0"/>
-              <a:t>10/4/2017</a:t>
+              <a:t>10/5/2017</a:t>
             </a:fld>
             <a:endParaRPr lang="en-US"/>
           </a:p>
@@ -771,7 +772,7 @@
           <a:p>
             <a:fld id="{CB384556-554C-48AB-B5D9-820D487758A7}" type="datetimeFigureOut">
               <a:rPr lang="en-US" smtClean="0"/>
-              <a:t>10/4/2017</a:t>
+              <a:t>10/5/2017</a:t>
             </a:fld>
             <a:endParaRPr lang="en-US"/>
           </a:p>
@@ -949,7 +950,7 @@
           <a:p>
             <a:fld id="{CB384556-554C-48AB-B5D9-820D487758A7}" type="datetimeFigureOut">
               <a:rPr lang="en-US" smtClean="0"/>
-              <a:t>10/4/2017</a:t>
+              <a:t>10/5/2017</a:t>
             </a:fld>
             <a:endParaRPr lang="en-US"/>
           </a:p>
@@ -1117,7 +1118,7 @@
           <a:p>
             <a:fld id="{CB384556-554C-48AB-B5D9-820D487758A7}" type="datetimeFigureOut">
               <a:rPr lang="en-US" smtClean="0"/>
-              <a:t>10/4/2017</a:t>
+              <a:t>10/5/2017</a:t>
             </a:fld>
             <a:endParaRPr lang="en-US"/>
           </a:p>
@@ -1362,7 +1363,7 @@
           <a:p>
             <a:fld id="{CB384556-554C-48AB-B5D9-820D487758A7}" type="datetimeFigureOut">
               <a:rPr lang="en-US" smtClean="0"/>
-              <a:t>10/4/2017</a:t>
+              <a:t>10/5/2017</a:t>
             </a:fld>
             <a:endParaRPr lang="en-US"/>
           </a:p>
@@ -1591,7 +1592,7 @@
           <a:p>
             <a:fld id="{CB384556-554C-48AB-B5D9-820D487758A7}" type="datetimeFigureOut">
               <a:rPr lang="en-US" smtClean="0"/>
-              <a:t>10/4/2017</a:t>
+              <a:t>10/5/2017</a:t>
             </a:fld>
             <a:endParaRPr lang="en-US"/>
           </a:p>
@@ -1955,7 +1956,7 @@
           <a:p>
             <a:fld id="{CB384556-554C-48AB-B5D9-820D487758A7}" type="datetimeFigureOut">
               <a:rPr lang="en-US" smtClean="0"/>
-              <a:t>10/4/2017</a:t>
+              <a:t>10/5/2017</a:t>
             </a:fld>
             <a:endParaRPr lang="en-US"/>
           </a:p>
@@ -2072,7 +2073,7 @@
           <a:p>
             <a:fld id="{CB384556-554C-48AB-B5D9-820D487758A7}" type="datetimeFigureOut">
               <a:rPr lang="en-US" smtClean="0"/>
-              <a:t>10/4/2017</a:t>
+              <a:t>10/5/2017</a:t>
             </a:fld>
             <a:endParaRPr lang="en-US"/>
           </a:p>
@@ -2167,7 +2168,7 @@
           <a:p>
             <a:fld id="{CB384556-554C-48AB-B5D9-820D487758A7}" type="datetimeFigureOut">
               <a:rPr lang="en-US" smtClean="0"/>
-              <a:t>10/4/2017</a:t>
+              <a:t>10/5/2017</a:t>
             </a:fld>
             <a:endParaRPr lang="en-US"/>
           </a:p>
@@ -2442,7 +2443,7 @@
           <a:p>
             <a:fld id="{CB384556-554C-48AB-B5D9-820D487758A7}" type="datetimeFigureOut">
               <a:rPr lang="en-US" smtClean="0"/>
-              <a:t>10/4/2017</a:t>
+              <a:t>10/5/2017</a:t>
             </a:fld>
             <a:endParaRPr lang="en-US"/>
           </a:p>
@@ -2694,7 +2695,7 @@
           <a:p>
             <a:fld id="{CB384556-554C-48AB-B5D9-820D487758A7}" type="datetimeFigureOut">
               <a:rPr lang="en-US" smtClean="0"/>
-              <a:t>10/4/2017</a:t>
+              <a:t>10/5/2017</a:t>
             </a:fld>
             <a:endParaRPr lang="en-US"/>
           </a:p>
@@ -2905,7 +2906,7 @@
           <a:p>
             <a:fld id="{CB384556-554C-48AB-B5D9-820D487758A7}" type="datetimeFigureOut">
               <a:rPr lang="en-US" smtClean="0"/>
-              <a:t>10/4/2017</a:t>
+              <a:t>10/5/2017</a:t>
             </a:fld>
             <a:endParaRPr lang="en-US"/>
           </a:p>
@@ -5113,6 +5114,192 @@
 </file>
 
 <file path=ppt/slides/slide7.xml><?xml version="1.0" encoding="utf-8"?>
+<p:sld xmlns:a="http://schemas.openxmlformats.org/drawingml/2006/main" xmlns:r="http://schemas.openxmlformats.org/officeDocument/2006/relationships" xmlns:p="http://schemas.openxmlformats.org/presentationml/2006/main">
+  <p:cSld>
+    <p:spTree>
+      <p:nvGrpSpPr>
+        <p:cNvPr id="1" name=""/>
+        <p:cNvGrpSpPr/>
+        <p:nvPr/>
+      </p:nvGrpSpPr>
+      <p:grpSpPr>
+        <a:xfrm>
+          <a:off x="0" y="0"/>
+          <a:ext cx="0" cy="0"/>
+          <a:chOff x="0" y="0"/>
+          <a:chExt cx="0" cy="0"/>
+        </a:xfrm>
+      </p:grpSpPr>
+      <p:sp>
+        <p:nvSpPr>
+          <p:cNvPr id="2" name="Title 1"/>
+          <p:cNvSpPr>
+            <a:spLocks noGrp="1"/>
+          </p:cNvSpPr>
+          <p:nvPr>
+            <p:ph type="title"/>
+          </p:nvPr>
+        </p:nvSpPr>
+        <p:spPr/>
+        <p:txBody>
+          <a:bodyPr>
+            <a:normAutofit/>
+          </a:bodyPr>
+          <a:lstStyle/>
+          <a:p>
+            <a:r>
+              <a:rPr lang="en-US" sz="4800" dirty="0">
+                <a:solidFill>
+                  <a:schemeClr val="bg1">
+                    <a:lumMod val="65000"/>
+                  </a:schemeClr>
+                </a:solidFill>
+                <a:latin typeface="Lato Black" panose="020F0A02020204030203" pitchFamily="34" charset="0"/>
+              </a:rPr>
+              <a:t>Code and Slide Deck</a:t>
+            </a:r>
+          </a:p>
+        </p:txBody>
+      </p:sp>
+      <p:sp>
+        <p:nvSpPr>
+          <p:cNvPr id="4" name="Rectangle 3"/>
+          <p:cNvSpPr/>
+          <p:nvPr/>
+        </p:nvSpPr>
+        <p:spPr>
+          <a:xfrm>
+            <a:off x="0" y="6519333"/>
+            <a:ext cx="12192000" cy="338667"/>
+          </a:xfrm>
+          <a:prstGeom prst="rect">
+            <a:avLst/>
+          </a:prstGeom>
+          <a:solidFill>
+            <a:schemeClr val="accent2"/>
+          </a:solidFill>
+          <a:ln>
+            <a:noFill/>
+          </a:ln>
+        </p:spPr>
+        <p:style>
+          <a:lnRef idx="2">
+            <a:schemeClr val="accent1">
+              <a:shade val="50000"/>
+            </a:schemeClr>
+          </a:lnRef>
+          <a:fillRef idx="1">
+            <a:schemeClr val="accent1"/>
+          </a:fillRef>
+          <a:effectRef idx="0">
+            <a:schemeClr val="accent1"/>
+          </a:effectRef>
+          <a:fontRef idx="minor">
+            <a:schemeClr val="lt1"/>
+          </a:fontRef>
+        </p:style>
+        <p:txBody>
+          <a:bodyPr rtlCol="0" anchor="ctr"/>
+          <a:lstStyle/>
+          <a:p>
+            <a:pPr algn="ctr"/>
+            <a:endParaRPr lang="en-US"/>
+          </a:p>
+        </p:txBody>
+      </p:sp>
+      <p:sp>
+        <p:nvSpPr>
+          <p:cNvPr id="3" name="TextBox 2">
+            <a:extLst>
+              <a:ext uri="{FF2B5EF4-FFF2-40B4-BE49-F238E27FC236}">
+                <a16:creationId xmlns:a16="http://schemas.microsoft.com/office/drawing/2014/main" id="{7BFD9201-E93E-4646-BA30-8E036F03F9C2}"/>
+              </a:ext>
+            </a:extLst>
+          </p:cNvPr>
+          <p:cNvSpPr txBox="1"/>
+          <p:nvPr/>
+        </p:nvSpPr>
+        <p:spPr>
+          <a:xfrm>
+            <a:off x="924127" y="2213042"/>
+            <a:ext cx="6162472" cy="2031325"/>
+          </a:xfrm>
+          <a:prstGeom prst="rect">
+            <a:avLst/>
+          </a:prstGeom>
+          <a:noFill/>
+        </p:spPr>
+        <p:txBody>
+          <a:bodyPr wrap="square" rtlCol="0">
+            <a:spAutoFit/>
+          </a:bodyPr>
+          <a:lstStyle/>
+          <a:p>
+            <a:r>
+              <a:rPr lang="en-US" dirty="0">
+                <a:solidFill>
+                  <a:srgbClr val="7F7F7F"/>
+                </a:solidFill>
+                <a:latin typeface="PT Sans"/>
+                <a:hlinkClick r:id="rId2"/>
+              </a:rPr>
+              <a:t>https://github.com/JeffCren-UDig/RDNUG_LUIS</a:t>
+            </a:r>
+            <a:endParaRPr lang="en-US" dirty="0">
+              <a:solidFill>
+                <a:srgbClr val="7F7F7F"/>
+              </a:solidFill>
+              <a:latin typeface="PT Sans"/>
+            </a:endParaRPr>
+          </a:p>
+          <a:p>
+            <a:endParaRPr lang="en-US" dirty="0">
+              <a:solidFill>
+                <a:srgbClr val="7F7F7F"/>
+              </a:solidFill>
+            </a:endParaRPr>
+          </a:p>
+          <a:p>
+            <a:endParaRPr lang="en-US" dirty="0">
+              <a:solidFill>
+                <a:srgbClr val="7F7F7F"/>
+              </a:solidFill>
+            </a:endParaRPr>
+          </a:p>
+          <a:p>
+            <a:r>
+              <a:rPr lang="en-US" dirty="0">
+                <a:hlinkClick r:id="rId3"/>
+              </a:rPr>
+              <a:t>http://bit.ly/2xXe3x5</a:t>
+            </a:r>
+            <a:endParaRPr lang="en-US" dirty="0"/>
+          </a:p>
+          <a:p>
+            <a:endParaRPr lang="en-US" dirty="0"/>
+          </a:p>
+          <a:p>
+            <a:endParaRPr lang="en-US"/>
+          </a:p>
+          <a:p>
+            <a:endParaRPr lang="en-US" dirty="0"/>
+          </a:p>
+        </p:txBody>
+      </p:sp>
+    </p:spTree>
+    <p:extLst>
+      <p:ext uri="{BB962C8B-B14F-4D97-AF65-F5344CB8AC3E}">
+        <p14:creationId xmlns:p14="http://schemas.microsoft.com/office/powerpoint/2010/main" val="3580362251"/>
+      </p:ext>
+    </p:extLst>
+  </p:cSld>
+  <p:clrMapOvr>
+    <a:masterClrMapping/>
+  </p:clrMapOvr>
+</p:sld>
+</file>
+
+<file path=ppt/slides/slide8.xml><?xml version="1.0" encoding="utf-8"?>
 <p:sld xmlns:a="http://schemas.openxmlformats.org/drawingml/2006/main" xmlns:r="http://schemas.openxmlformats.org/officeDocument/2006/relationships" xmlns:p="http://schemas.openxmlformats.org/presentationml/2006/main">
   <p:cSld>
     <p:spTree>
@@ -5695,57 +5882,6 @@
 </file>
 
 <file path=customXml/item1.xml><?xml version="1.0" encoding="utf-8"?>
-<?mso-contentType ?>
-<FormTemplates xmlns="http://schemas.microsoft.com/sharepoint/v3/contenttype/forms">
-  <Display>DocumentLibraryForm</Display>
-  <Edit>DocumentLibraryForm</Edit>
-  <New>DocumentLibraryForm</New>
-</FormTemplates>
-</file>
-
-<file path=customXml/item2.xml><?xml version="1.0" encoding="utf-8"?>
-<p:properties xmlns:p="http://schemas.microsoft.com/office/2006/metadata/properties" xmlns:xsi="http://www.w3.org/2001/XMLSchema-instance" xmlns:pc="http://schemas.microsoft.com/office/infopath/2007/PartnerControls">
-  <documentManagement>
-    <Make_x0020_Important_x0020_Document xmlns="dc7580fb-96f9-4135-9faf-174254a85039">No</Make_x0020_Important_x0020_Document>
-    <Document_x0020_Owner xmlns="dc7580fb-96f9-4135-9faf-174254a85039">
-      <UserInfo>
-        <DisplayName>Amy Thompson</DisplayName>
-        <AccountId>41</AccountId>
-        <AccountType/>
-      </UserInfo>
-    </Document_x0020_Owner>
-    <jad815fecd974bdda0d3a29c7a8847be xmlns="dc7580fb-96f9-4135-9faf-174254a85039">
-      <Terms xmlns="http://schemas.microsoft.com/office/infopath/2007/PartnerControls">
-        <TermInfo xmlns="http://schemas.microsoft.com/office/infopath/2007/PartnerControls">
-          <TermName xmlns="http://schemas.microsoft.com/office/infopath/2007/PartnerControls">Presentation</TermName>
-          <TermId xmlns="http://schemas.microsoft.com/office/infopath/2007/PartnerControls">84edb6cd-3df1-4704-9712-3117f4eec912</TermId>
-        </TermInfo>
-      </Terms>
-    </jad815fecd974bdda0d3a29c7a8847be>
-    <TaxCatchAll xmlns="dc7580fb-96f9-4135-9faf-174254a85039">
-      <Value>46</Value>
-      <Value>7</Value>
-    </TaxCatchAll>
-    <cca2a5bc60ef45a9ab315ab93ed6145f xmlns="dc7580fb-96f9-4135-9faf-174254a85039">
-      <Terms xmlns="http://schemas.microsoft.com/office/infopath/2007/PartnerControls">
-        <TermInfo xmlns="http://schemas.microsoft.com/office/infopath/2007/PartnerControls">
-          <TermName xmlns="http://schemas.microsoft.com/office/infopath/2007/PartnerControls">Marketing</TermName>
-          <TermId xmlns="http://schemas.microsoft.com/office/infopath/2007/PartnerControls">5a56a741-1bc5-40cb-a40d-24d29dd22408</TermId>
-        </TermInfo>
-      </Terms>
-    </cca2a5bc60ef45a9ab315ab93ed6145f>
-    <j118e5d4d6ed472e9a7bdd58405bd58b xmlns="dc7580fb-96f9-4135-9faf-174254a85039">
-      <Terms xmlns="http://schemas.microsoft.com/office/infopath/2007/PartnerControls"/>
-    </j118e5d4d6ed472e9a7bdd58405bd58b>
-    <TaxKeywordTaxHTField xmlns="dc7580fb-96f9-4135-9faf-174254a85039">
-      <Terms xmlns="http://schemas.microsoft.com/office/infopath/2007/PartnerControls"/>
-    </TaxKeywordTaxHTField>
-    <UDig_x0020_Document_x0020_Type xmlns="dc7580fb-96f9-4135-9faf-174254a85039"/>
-  </documentManagement>
-</p:properties>
-</file>
-
-<file path=customXml/item3.xml><?xml version="1.0" encoding="utf-8"?>
 <ct:contentTypeSchema xmlns:ct="http://schemas.microsoft.com/office/2006/metadata/contentType" xmlns:ma="http://schemas.microsoft.com/office/2006/metadata/properties/metaAttributes" ct:_="" ma:_="" ma:contentTypeName="UDig Business Document" ma:contentTypeID="0x0101000BC9BD8CFFFF1E4CBEBF91BDD430818B003BDB83950D0FB443B15B31575551E75C" ma:contentTypeVersion="12" ma:contentTypeDescription="Content Type for UDig business documents" ma:contentTypeScope="" ma:versionID="4885a532b02cab7b93f479f5eec87b26">
   <xsd:schema xmlns:xsd="http://www.w3.org/2001/XMLSchema" xmlns:xs="http://www.w3.org/2001/XMLSchema" xmlns:p="http://schemas.microsoft.com/office/2006/metadata/properties" xmlns:ns2="dc7580fb-96f9-4135-9faf-174254a85039" targetNamespace="http://schemas.microsoft.com/office/2006/metadata/properties" ma:root="true" ma:fieldsID="c3931290349806d764d85e5aa55a8c60" ns2:_="">
     <xsd:import namespace="dc7580fb-96f9-4135-9faf-174254a85039"/>
@@ -5982,15 +6118,76 @@
 </ct:contentTypeSchema>
 </file>
 
+<file path=customXml/item2.xml><?xml version="1.0" encoding="utf-8"?>
+<p:properties xmlns:p="http://schemas.microsoft.com/office/2006/metadata/properties" xmlns:xsi="http://www.w3.org/2001/XMLSchema-instance" xmlns:pc="http://schemas.microsoft.com/office/infopath/2007/PartnerControls">
+  <documentManagement>
+    <Make_x0020_Important_x0020_Document xmlns="dc7580fb-96f9-4135-9faf-174254a85039">No</Make_x0020_Important_x0020_Document>
+    <Document_x0020_Owner xmlns="dc7580fb-96f9-4135-9faf-174254a85039">
+      <UserInfo>
+        <DisplayName>Amy Thompson</DisplayName>
+        <AccountId>41</AccountId>
+        <AccountType/>
+      </UserInfo>
+    </Document_x0020_Owner>
+    <jad815fecd974bdda0d3a29c7a8847be xmlns="dc7580fb-96f9-4135-9faf-174254a85039">
+      <Terms xmlns="http://schemas.microsoft.com/office/infopath/2007/PartnerControls">
+        <TermInfo xmlns="http://schemas.microsoft.com/office/infopath/2007/PartnerControls">
+          <TermName xmlns="http://schemas.microsoft.com/office/infopath/2007/PartnerControls">Presentation</TermName>
+          <TermId xmlns="http://schemas.microsoft.com/office/infopath/2007/PartnerControls">84edb6cd-3df1-4704-9712-3117f4eec912</TermId>
+        </TermInfo>
+      </Terms>
+    </jad815fecd974bdda0d3a29c7a8847be>
+    <TaxCatchAll xmlns="dc7580fb-96f9-4135-9faf-174254a85039">
+      <Value>46</Value>
+      <Value>7</Value>
+    </TaxCatchAll>
+    <cca2a5bc60ef45a9ab315ab93ed6145f xmlns="dc7580fb-96f9-4135-9faf-174254a85039">
+      <Terms xmlns="http://schemas.microsoft.com/office/infopath/2007/PartnerControls">
+        <TermInfo xmlns="http://schemas.microsoft.com/office/infopath/2007/PartnerControls">
+          <TermName xmlns="http://schemas.microsoft.com/office/infopath/2007/PartnerControls">Marketing</TermName>
+          <TermId xmlns="http://schemas.microsoft.com/office/infopath/2007/PartnerControls">5a56a741-1bc5-40cb-a40d-24d29dd22408</TermId>
+        </TermInfo>
+      </Terms>
+    </cca2a5bc60ef45a9ab315ab93ed6145f>
+    <j118e5d4d6ed472e9a7bdd58405bd58b xmlns="dc7580fb-96f9-4135-9faf-174254a85039">
+      <Terms xmlns="http://schemas.microsoft.com/office/infopath/2007/PartnerControls"/>
+    </j118e5d4d6ed472e9a7bdd58405bd58b>
+    <TaxKeywordTaxHTField xmlns="dc7580fb-96f9-4135-9faf-174254a85039">
+      <Terms xmlns="http://schemas.microsoft.com/office/infopath/2007/PartnerControls"/>
+    </TaxKeywordTaxHTField>
+    <UDig_x0020_Document_x0020_Type xmlns="dc7580fb-96f9-4135-9faf-174254a85039"/>
+  </documentManagement>
+</p:properties>
+</file>
+
+<file path=customXml/item3.xml><?xml version="1.0" encoding="utf-8"?>
+<?mso-contentType ?>
+<FormTemplates xmlns="http://schemas.microsoft.com/sharepoint/v3/contenttype/forms">
+  <Display>DocumentLibraryForm</Display>
+  <Edit>DocumentLibraryForm</Edit>
+  <New>DocumentLibraryForm</New>
+</FormTemplates>
+</file>
+
 <file path=customXml/item4.xml><?xml version="1.0" encoding="utf-8"?>
 <?mso-contentType ?>
 <SharedContentType xmlns="Microsoft.SharePoint.Taxonomy.ContentTypeSync" SourceId="285b7fcb-4e6a-40fa-a39c-962326238d2a" ContentTypeId="0x0101000BC9BD8CFFFF1E4CBEBF91BDD430818B" PreviousValue="false"/>
 </file>
 
 <file path=customXml/itemProps1.xml><?xml version="1.0" encoding="utf-8"?>
-<ds:datastoreItem xmlns:ds="http://schemas.openxmlformats.org/officeDocument/2006/customXml" ds:itemID="{35BC7B23-5B02-4781-8426-29EBDD231E3E}">
+<ds:datastoreItem xmlns:ds="http://schemas.openxmlformats.org/officeDocument/2006/customXml" ds:itemID="{09A24748-D3F5-42FC-8343-04E69B562773}">
   <ds:schemaRefs>
-    <ds:schemaRef ds:uri="http://schemas.microsoft.com/sharepoint/v3/contenttype/forms"/>
+    <ds:schemaRef ds:uri="http://schemas.microsoft.com/office/2006/metadata/contentType"/>
+    <ds:schemaRef ds:uri="http://schemas.microsoft.com/office/2006/metadata/properties/metaAttributes"/>
+    <ds:schemaRef ds:uri="http://www.w3.org/2001/XMLSchema"/>
+    <ds:schemaRef ds:uri="http://schemas.microsoft.com/office/2006/metadata/properties"/>
+    <ds:schemaRef ds:uri="dc7580fb-96f9-4135-9faf-174254a85039"/>
+    <ds:schemaRef ds:uri="http://schemas.microsoft.com/office/2006/documentManagement/types"/>
+    <ds:schemaRef ds:uri="http://schemas.microsoft.com/office/infopath/2007/PartnerControls"/>
+    <ds:schemaRef ds:uri="http://schemas.openxmlformats.org/package/2006/metadata/core-properties"/>
+    <ds:schemaRef ds:uri="http://purl.org/dc/elements/1.1/"/>
+    <ds:schemaRef ds:uri="http://purl.org/dc/terms/"/>
+    <ds:schemaRef ds:uri="http://schemas.microsoft.com/internal/obd"/>
   </ds:schemaRefs>
 </ds:datastoreItem>
 </file>
@@ -6012,19 +6209,9 @@
 </file>
 
 <file path=customXml/itemProps3.xml><?xml version="1.0" encoding="utf-8"?>
-<ds:datastoreItem xmlns:ds="http://schemas.openxmlformats.org/officeDocument/2006/customXml" ds:itemID="{09A24748-D3F5-42FC-8343-04E69B562773}">
+<ds:datastoreItem xmlns:ds="http://schemas.openxmlformats.org/officeDocument/2006/customXml" ds:itemID="{35BC7B23-5B02-4781-8426-29EBDD231E3E}">
   <ds:schemaRefs>
-    <ds:schemaRef ds:uri="http://schemas.microsoft.com/office/2006/metadata/contentType"/>
-    <ds:schemaRef ds:uri="http://schemas.microsoft.com/office/2006/metadata/properties/metaAttributes"/>
-    <ds:schemaRef ds:uri="http://www.w3.org/2001/XMLSchema"/>
-    <ds:schemaRef ds:uri="http://schemas.microsoft.com/office/2006/metadata/properties"/>
-    <ds:schemaRef ds:uri="dc7580fb-96f9-4135-9faf-174254a85039"/>
-    <ds:schemaRef ds:uri="http://schemas.microsoft.com/office/2006/documentManagement/types"/>
-    <ds:schemaRef ds:uri="http://schemas.microsoft.com/office/infopath/2007/PartnerControls"/>
-    <ds:schemaRef ds:uri="http://schemas.openxmlformats.org/package/2006/metadata/core-properties"/>
-    <ds:schemaRef ds:uri="http://purl.org/dc/elements/1.1/"/>
-    <ds:schemaRef ds:uri="http://purl.org/dc/terms/"/>
-    <ds:schemaRef ds:uri="http://schemas.microsoft.com/internal/obd"/>
+    <ds:schemaRef ds:uri="http://schemas.microsoft.com/sharepoint/v3/contenttype/forms"/>
   </ds:schemaRefs>
 </ds:datastoreItem>
 </file>

</xml_diff>